<commit_message>
biz cards delete card
</commit_message>
<xml_diff>
--- a/docs/React.pptx
+++ b/docs/React.pptx
@@ -9936,6 +9936,9 @@
             <a:r>
               <a:rPr lang="en-US" sz="1800" dirty="0" err="1">
                 <a:effectLst/>
+                <a:highlight>
+                  <a:srgbClr val="FFFF00"/>
+                </a:highlight>
                 <a:latin typeface="Calibri" panose="020F0502020204030204" pitchFamily="34" charset="0"/>
                 <a:ea typeface="Calibri" panose="020F0502020204030204" pitchFamily="34" charset="0"/>
                 <a:cs typeface="Arial" panose="020B0604020202020204" pitchFamily="34" charset="0"/>
@@ -9943,6 +9946,110 @@
               <a:t>useEffect</a:t>
             </a:r>
             <a:endParaRPr lang="en-US" sz="1800" dirty="0">
+              <a:highlight>
+                <a:srgbClr val="FFFF00"/>
+              </a:highlight>
+              <a:latin typeface="Calibri" panose="020F0502020204030204" pitchFamily="34" charset="0"/>
+              <a:ea typeface="Calibri" panose="020F0502020204030204" pitchFamily="34" charset="0"/>
+              <a:cs typeface="Arial" panose="020B0604020202020204" pitchFamily="34" charset="0"/>
+            </a:endParaRPr>
+          </a:p>
+          <a:p>
+            <a:pPr marL="342900" marR="0" lvl="0" indent="-342900">
+              <a:lnSpc>
+                <a:spcPct val="107000"/>
+              </a:lnSpc>
+              <a:spcBef>
+                <a:spcPts val="0"/>
+              </a:spcBef>
+              <a:spcAft>
+                <a:spcPts val="0"/>
+              </a:spcAft>
+              <a:buFont typeface="+mj-lt"/>
+              <a:buAutoNum type="arabicParenR"/>
+            </a:pPr>
+            <a:r>
+              <a:rPr lang="en-US" sz="1600" dirty="0">
+                <a:effectLst/>
+                <a:latin typeface="Calibri" panose="020F0502020204030204" pitchFamily="34" charset="0"/>
+                <a:ea typeface="Calibri" panose="020F0502020204030204" pitchFamily="34" charset="0"/>
+                <a:cs typeface="Arial" panose="020B0604020202020204" pitchFamily="34" charset="0"/>
+              </a:rPr>
+              <a:t>cards panel</a:t>
+            </a:r>
+          </a:p>
+          <a:p>
+            <a:pPr marL="617220" lvl="1" indent="-342900">
+              <a:lnSpc>
+                <a:spcPct val="107000"/>
+              </a:lnSpc>
+              <a:spcBef>
+                <a:spcPts val="0"/>
+              </a:spcBef>
+              <a:buFont typeface="+mj-lt"/>
+              <a:buAutoNum type="arabicParenR"/>
+            </a:pPr>
+            <a:r>
+              <a:rPr lang="en-US" sz="1400" dirty="0">
+                <a:highlight>
+                  <a:srgbClr val="FFFF00"/>
+                </a:highlight>
+                <a:latin typeface="Calibri" panose="020F0502020204030204" pitchFamily="34" charset="0"/>
+                <a:ea typeface="Calibri" panose="020F0502020204030204" pitchFamily="34" charset="0"/>
+                <a:cs typeface="Arial" panose="020B0604020202020204" pitchFamily="34" charset="0"/>
+              </a:rPr>
+              <a:t>get</a:t>
+            </a:r>
+            <a:endParaRPr lang="en-US" sz="1400" dirty="0">
+              <a:effectLst/>
+              <a:highlight>
+                <a:srgbClr val="FFFF00"/>
+              </a:highlight>
+              <a:latin typeface="Calibri" panose="020F0502020204030204" pitchFamily="34" charset="0"/>
+              <a:ea typeface="Calibri" panose="020F0502020204030204" pitchFamily="34" charset="0"/>
+              <a:cs typeface="Arial" panose="020B0604020202020204" pitchFamily="34" charset="0"/>
+            </a:endParaRPr>
+          </a:p>
+          <a:p>
+            <a:pPr marL="617220" lvl="1" indent="-342900">
+              <a:lnSpc>
+                <a:spcPct val="107000"/>
+              </a:lnSpc>
+              <a:spcBef>
+                <a:spcPts val="0"/>
+              </a:spcBef>
+              <a:buFont typeface="+mj-lt"/>
+              <a:buAutoNum type="arabicParenR"/>
+            </a:pPr>
+            <a:r>
+              <a:rPr lang="en-US" sz="1400" dirty="0">
+                <a:latin typeface="Calibri" panose="020F0502020204030204" pitchFamily="34" charset="0"/>
+                <a:ea typeface="Calibri" panose="020F0502020204030204" pitchFamily="34" charset="0"/>
+                <a:cs typeface="Arial" panose="020B0604020202020204" pitchFamily="34" charset="0"/>
+              </a:rPr>
+              <a:t>edit</a:t>
+            </a:r>
+          </a:p>
+          <a:p>
+            <a:pPr marL="617220" lvl="1" indent="-342900">
+              <a:lnSpc>
+                <a:spcPct val="107000"/>
+              </a:lnSpc>
+              <a:spcBef>
+                <a:spcPts val="0"/>
+              </a:spcBef>
+              <a:buFont typeface="+mj-lt"/>
+              <a:buAutoNum type="arabicParenR"/>
+            </a:pPr>
+            <a:r>
+              <a:rPr lang="en-US" sz="1400" dirty="0">
+                <a:latin typeface="Calibri" panose="020F0502020204030204" pitchFamily="34" charset="0"/>
+                <a:ea typeface="Calibri" panose="020F0502020204030204" pitchFamily="34" charset="0"/>
+                <a:cs typeface="Arial" panose="020B0604020202020204" pitchFamily="34" charset="0"/>
+              </a:rPr>
+              <a:t>delete</a:t>
+            </a:r>
+            <a:endParaRPr lang="en-US" sz="1400" dirty="0">
               <a:effectLst/>
               <a:latin typeface="Calibri" panose="020F0502020204030204" pitchFamily="34" charset="0"/>
               <a:ea typeface="Calibri" panose="020F0502020204030204" pitchFamily="34" charset="0"/>

</xml_diff>

<commit_message>
redux toolkit not finished
</commit_message>
<xml_diff>
--- a/docs/React.pptx
+++ b/docs/React.pptx
@@ -5,7 +5,7 @@
     <p:sldMasterId id="2147483660" r:id="rId4"/>
   </p:sldMasterIdLst>
   <p:notesMasterIdLst>
-    <p:notesMasterId r:id="rId53"/>
+    <p:notesMasterId r:id="rId54"/>
   </p:notesMasterIdLst>
   <p:sldIdLst>
     <p:sldId id="264" r:id="rId5"/>
@@ -56,6 +56,7 @@
     <p:sldId id="357" r:id="rId50"/>
     <p:sldId id="359" r:id="rId51"/>
     <p:sldId id="360" r:id="rId52"/>
+    <p:sldId id="361" r:id="rId53"/>
   </p:sldIdLst>
   <p:sldSz cx="12192000" cy="6858000"/>
   <p:notesSz cx="6858000" cy="9144000"/>
@@ -11449,6 +11450,139 @@
     <p:extLst>
       <p:ext uri="{BB962C8B-B14F-4D97-AF65-F5344CB8AC3E}">
         <p14:creationId xmlns:p14="http://schemas.microsoft.com/office/powerpoint/2010/main" val="2868801317"/>
+      </p:ext>
+    </p:extLst>
+  </p:cSld>
+  <p:clrMapOvr>
+    <a:masterClrMapping/>
+  </p:clrMapOvr>
+</p:sld>
+</file>
+
+<file path=ppt/slides/slide49.xml><?xml version="1.0" encoding="utf-8"?>
+<p:sld xmlns:a="http://schemas.openxmlformats.org/drawingml/2006/main" xmlns:r="http://schemas.openxmlformats.org/officeDocument/2006/relationships" xmlns:p="http://schemas.openxmlformats.org/presentationml/2006/main">
+  <p:cSld>
+    <p:spTree>
+      <p:nvGrpSpPr>
+        <p:cNvPr id="1" name=""/>
+        <p:cNvGrpSpPr/>
+        <p:nvPr/>
+      </p:nvGrpSpPr>
+      <p:grpSpPr>
+        <a:xfrm>
+          <a:off x="0" y="0"/>
+          <a:ext cx="0" cy="0"/>
+          <a:chOff x="0" y="0"/>
+          <a:chExt cx="0" cy="0"/>
+        </a:xfrm>
+      </p:grpSpPr>
+      <p:sp>
+        <p:nvSpPr>
+          <p:cNvPr id="2" name="Title 1">
+            <a:extLst>
+              <a:ext uri="{FF2B5EF4-FFF2-40B4-BE49-F238E27FC236}">
+                <a16:creationId xmlns:a16="http://schemas.microsoft.com/office/drawing/2014/main" id="{78E8ABDA-916E-AB3F-5616-E014AEDD3C2A}"/>
+              </a:ext>
+            </a:extLst>
+          </p:cNvPr>
+          <p:cNvSpPr>
+            <a:spLocks noGrp="1"/>
+          </p:cNvSpPr>
+          <p:nvPr>
+            <p:ph type="title"/>
+          </p:nvPr>
+        </p:nvSpPr>
+        <p:spPr/>
+        <p:txBody>
+          <a:bodyPr/>
+          <a:lstStyle/>
+          <a:p>
+            <a:r>
+              <a:rPr lang="en-US" dirty="0"/>
+              <a:t>redux</a:t>
+            </a:r>
+          </a:p>
+        </p:txBody>
+      </p:sp>
+      <p:sp>
+        <p:nvSpPr>
+          <p:cNvPr id="3" name="Content Placeholder 2">
+            <a:extLst>
+              <a:ext uri="{FF2B5EF4-FFF2-40B4-BE49-F238E27FC236}">
+                <a16:creationId xmlns:a16="http://schemas.microsoft.com/office/drawing/2014/main" id="{4766888F-D215-2EE0-FF2C-6CEA4A1C33B0}"/>
+              </a:ext>
+            </a:extLst>
+          </p:cNvPr>
+          <p:cNvSpPr>
+            <a:spLocks noGrp="1"/>
+          </p:cNvSpPr>
+          <p:nvPr>
+            <p:ph idx="1"/>
+          </p:nvPr>
+        </p:nvSpPr>
+        <p:spPr/>
+        <p:txBody>
+          <a:bodyPr/>
+          <a:lstStyle/>
+          <a:p>
+            <a:r>
+              <a:rPr lang="en-US" dirty="0"/>
+              <a:t>come to solve a big problem with passing data between components/pages</a:t>
+            </a:r>
+          </a:p>
+          <a:p>
+            <a:r>
+              <a:rPr lang="en-US" dirty="0"/>
+              <a:t>by creating global state accessible from all the components</a:t>
+            </a:r>
+            <a:r>
+              <a:rPr lang="en-US"/>
+              <a:t>/pages</a:t>
+            </a:r>
+            <a:endParaRPr lang="en-US" dirty="0"/>
+          </a:p>
+          <a:p>
+            <a:endParaRPr lang="en-US" dirty="0"/>
+          </a:p>
+          <a:p>
+            <a:r>
+              <a:rPr lang="en-US" dirty="0"/>
+              <a:t>to install redux use this commands</a:t>
+            </a:r>
+          </a:p>
+          <a:p>
+            <a:endParaRPr lang="en-US" dirty="0"/>
+          </a:p>
+          <a:p>
+            <a:r>
+              <a:rPr lang="en-US" dirty="0" err="1"/>
+              <a:t>npm</a:t>
+            </a:r>
+            <a:r>
+              <a:rPr lang="en-US" dirty="0"/>
+              <a:t> </a:t>
+            </a:r>
+            <a:r>
+              <a:rPr lang="en-US" dirty="0" err="1"/>
+              <a:t>i</a:t>
+            </a:r>
+            <a:r>
+              <a:rPr lang="en-US" dirty="0"/>
+              <a:t> redux react-redux @reduxjs/toolkit</a:t>
+            </a:r>
+          </a:p>
+          <a:p>
+            <a:endParaRPr lang="en-US" dirty="0"/>
+          </a:p>
+          <a:p>
+            <a:endParaRPr lang="en-US" dirty="0"/>
+          </a:p>
+        </p:txBody>
+      </p:sp>
+    </p:spTree>
+    <p:extLst>
+      <p:ext uri="{BB962C8B-B14F-4D97-AF65-F5344CB8AC3E}">
+        <p14:creationId xmlns:p14="http://schemas.microsoft.com/office/powerpoint/2010/main" val="2442028270"/>
       </p:ext>
     </p:extLst>
   </p:cSld>

</xml_diff>